<commit_message>
DEV: update to 8.2.1
</commit_message>
<xml_diff>
--- a/doc/masters/modules.pptx
+++ b/doc/masters/modules.pptx
@@ -104,6 +104,22 @@
       </a:defRPr>
     </a:lvl9pPr>
   </p:defaultTextStyle>
+  <p:extLst>
+    <p:ext uri="{EFAFB233-063F-42B5-8137-9DF3F51BA10A}">
+      <p15:sldGuideLst xmlns:p15="http://schemas.microsoft.com/office/powerpoint/2012/main">
+        <p15:guide id="1" orient="horz" pos="2832" userDrawn="1">
+          <p15:clr>
+            <a:srgbClr val="A4A3A4"/>
+          </p15:clr>
+        </p15:guide>
+        <p15:guide id="2" pos="3120" userDrawn="1">
+          <p15:clr>
+            <a:srgbClr val="A4A3A4"/>
+          </p15:clr>
+        </p15:guide>
+      </p15:sldGuideLst>
+    </p:ext>
+  </p:extLst>
 </p:presentation>
 </file>
 
@@ -288,7 +304,7 @@
           <a:p>
             <a:fld id="{1A19F2B4-5B4D-FB49-BAB8-7377D6D56229}" type="datetimeFigureOut">
               <a:rPr lang="en-US" smtClean="0"/>
-              <a:t>3/9/15</a:t>
+              <a:t>12/13/18</a:t>
             </a:fld>
             <a:endParaRPr lang="en-US"/>
           </a:p>
@@ -453,7 +469,7 @@
           <a:p>
             <a:fld id="{1A19F2B4-5B4D-FB49-BAB8-7377D6D56229}" type="datetimeFigureOut">
               <a:rPr lang="en-US" smtClean="0"/>
-              <a:t>3/9/15</a:t>
+              <a:t>12/13/18</a:t>
             </a:fld>
             <a:endParaRPr lang="en-US"/>
           </a:p>
@@ -628,7 +644,7 @@
           <a:p>
             <a:fld id="{1A19F2B4-5B4D-FB49-BAB8-7377D6D56229}" type="datetimeFigureOut">
               <a:rPr lang="en-US" smtClean="0"/>
-              <a:t>3/9/15</a:t>
+              <a:t>12/13/18</a:t>
             </a:fld>
             <a:endParaRPr lang="en-US"/>
           </a:p>
@@ -793,7 +809,7 @@
           <a:p>
             <a:fld id="{1A19F2B4-5B4D-FB49-BAB8-7377D6D56229}" type="datetimeFigureOut">
               <a:rPr lang="en-US" smtClean="0"/>
-              <a:t>3/9/15</a:t>
+              <a:t>12/13/18</a:t>
             </a:fld>
             <a:endParaRPr lang="en-US"/>
           </a:p>
@@ -1034,7 +1050,7 @@
           <a:p>
             <a:fld id="{1A19F2B4-5B4D-FB49-BAB8-7377D6D56229}" type="datetimeFigureOut">
               <a:rPr lang="en-US" smtClean="0"/>
-              <a:t>3/9/15</a:t>
+              <a:t>12/13/18</a:t>
             </a:fld>
             <a:endParaRPr lang="en-US"/>
           </a:p>
@@ -1317,7 +1333,7 @@
           <a:p>
             <a:fld id="{1A19F2B4-5B4D-FB49-BAB8-7377D6D56229}" type="datetimeFigureOut">
               <a:rPr lang="en-US" smtClean="0"/>
-              <a:t>3/9/15</a:t>
+              <a:t>12/13/18</a:t>
             </a:fld>
             <a:endParaRPr lang="en-US"/>
           </a:p>
@@ -1734,7 +1750,7 @@
           <a:p>
             <a:fld id="{1A19F2B4-5B4D-FB49-BAB8-7377D6D56229}" type="datetimeFigureOut">
               <a:rPr lang="en-US" smtClean="0"/>
-              <a:t>3/9/15</a:t>
+              <a:t>12/13/18</a:t>
             </a:fld>
             <a:endParaRPr lang="en-US"/>
           </a:p>
@@ -1847,7 +1863,7 @@
           <a:p>
             <a:fld id="{1A19F2B4-5B4D-FB49-BAB8-7377D6D56229}" type="datetimeFigureOut">
               <a:rPr lang="en-US" smtClean="0"/>
-              <a:t>3/9/15</a:t>
+              <a:t>12/13/18</a:t>
             </a:fld>
             <a:endParaRPr lang="en-US"/>
           </a:p>
@@ -1937,7 +1953,7 @@
           <a:p>
             <a:fld id="{1A19F2B4-5B4D-FB49-BAB8-7377D6D56229}" type="datetimeFigureOut">
               <a:rPr lang="en-US" smtClean="0"/>
-              <a:t>3/9/15</a:t>
+              <a:t>12/13/18</a:t>
             </a:fld>
             <a:endParaRPr lang="en-US"/>
           </a:p>
@@ -2209,7 +2225,7 @@
           <a:p>
             <a:fld id="{1A19F2B4-5B4D-FB49-BAB8-7377D6D56229}" type="datetimeFigureOut">
               <a:rPr lang="en-US" smtClean="0"/>
-              <a:t>3/9/15</a:t>
+              <a:t>12/13/18</a:t>
             </a:fld>
             <a:endParaRPr lang="en-US"/>
           </a:p>
@@ -2457,7 +2473,7 @@
           <a:p>
             <a:fld id="{1A19F2B4-5B4D-FB49-BAB8-7377D6D56229}" type="datetimeFigureOut">
               <a:rPr lang="en-US" smtClean="0"/>
-              <a:t>3/9/15</a:t>
+              <a:t>12/13/18</a:t>
             </a:fld>
             <a:endParaRPr lang="en-US"/>
           </a:p>
@@ -2665,7 +2681,7 @@
           <a:p>
             <a:fld id="{1A19F2B4-5B4D-FB49-BAB8-7377D6D56229}" type="datetimeFigureOut">
               <a:rPr lang="en-US" smtClean="0"/>
-              <a:t>3/9/15</a:t>
+              <a:t>12/13/18</a:t>
             </a:fld>
             <a:endParaRPr lang="en-US"/>
           </a:p>
@@ -3044,7 +3060,7 @@
         <p:spPr>
           <a:xfrm>
             <a:off x="2438400" y="609600"/>
-            <a:ext cx="4953000" cy="4572000"/>
+            <a:ext cx="4953000" cy="5486400"/>
           </a:xfrm>
           <a:prstGeom prst="rect">
             <a:avLst/>
@@ -3113,79 +3129,23 @@
       </p:sp>
       <p:sp>
         <p:nvSpPr>
-          <p:cNvPr id="5" name="Rectangle 4"/>
+          <p:cNvPr id="7" name="Rectangle 6"/>
           <p:cNvSpPr/>
           <p:nvPr/>
         </p:nvSpPr>
         <p:spPr>
           <a:xfrm>
-            <a:off x="6705600" y="1523195"/>
-            <a:ext cx="329419" cy="2399514"/>
+            <a:off x="3377932" y="1489588"/>
+            <a:ext cx="977113" cy="265109"/>
           </a:xfrm>
           <a:prstGeom prst="rect">
             <a:avLst/>
           </a:prstGeom>
           <a:solidFill>
-            <a:srgbClr val="F79646"/>
+            <a:schemeClr val="accent1">
+              <a:lumMod val="75000"/>
+            </a:schemeClr>
           </a:solidFill>
-          <a:ln w="6350" cap="flat" cmpd="sng" algn="ctr">
-            <a:solidFill>
-              <a:schemeClr val="tx1"/>
-            </a:solidFill>
-            <a:prstDash val="solid"/>
-            <a:round/>
-            <a:headEnd type="none" w="med" len="med"/>
-            <a:tailEnd type="none" w="med" len="med"/>
-          </a:ln>
-          <a:effectLst>
-            <a:glow rad="63500">
-              <a:schemeClr val="accent1">
-                <a:alpha val="75000"/>
-              </a:schemeClr>
-            </a:glow>
-          </a:effectLst>
-        </p:spPr>
-        <p:style>
-          <a:lnRef idx="1">
-            <a:schemeClr val="accent2"/>
-          </a:lnRef>
-          <a:fillRef idx="3">
-            <a:schemeClr val="accent2"/>
-          </a:fillRef>
-          <a:effectRef idx="2">
-            <a:schemeClr val="accent2"/>
-          </a:effectRef>
-          <a:fontRef idx="minor">
-            <a:schemeClr val="lt1"/>
-          </a:fontRef>
-        </p:style>
-        <p:txBody>
-          <a:bodyPr vert="vert" rtlCol="0" anchor="ctr"/>
-          <a:lstStyle/>
-          <a:p>
-            <a:pPr algn="ctr"/>
-            <a:r>
-              <a:rPr lang="en-US" sz="1400" b="1" dirty="0" smtClean="0"/>
-              <a:t>Secure Sockets (SSL)</a:t>
-            </a:r>
-            <a:endParaRPr lang="en-US" sz="1400" b="1" dirty="0"/>
-          </a:p>
-        </p:txBody>
-      </p:sp>
-      <p:sp>
-        <p:nvSpPr>
-          <p:cNvPr id="7" name="Rectangle 6"/>
-          <p:cNvSpPr/>
-          <p:nvPr/>
-        </p:nvSpPr>
-        <p:spPr>
-          <a:xfrm>
-            <a:off x="2895600" y="1660956"/>
-            <a:ext cx="977113" cy="265109"/>
-          </a:xfrm>
-          <a:prstGeom prst="rect">
-            <a:avLst/>
-          </a:prstGeom>
           <a:ln>
             <a:solidFill>
               <a:schemeClr val="tx2">
@@ -3236,12 +3196,18 @@
         </p:nvSpPr>
         <p:spPr>
           <a:xfrm>
-            <a:off x="2778955" y="4572006"/>
+            <a:off x="2819400" y="5477834"/>
             <a:ext cx="4256063" cy="380994"/>
           </a:xfrm>
           <a:prstGeom prst="rect">
             <a:avLst/>
           </a:prstGeom>
+          <a:solidFill>
+            <a:schemeClr val="accent5">
+              <a:lumMod val="40000"/>
+              <a:lumOff val="60000"/>
+            </a:schemeClr>
+          </a:solidFill>
           <a:ln>
             <a:headEnd type="none" w="med" len="med"/>
             <a:tailEnd type="none" w="med" len="med"/>
@@ -3267,14 +3233,35 @@
           <a:p>
             <a:pPr algn="ctr"/>
             <a:r>
-              <a:rPr lang="en-US" sz="1400" dirty="0" smtClean="0"/>
+              <a:rPr lang="en-US" sz="1400" dirty="0" smtClean="0">
+                <a:solidFill>
+                  <a:schemeClr val="tx1">
+                    <a:lumMod val="95000"/>
+                    <a:lumOff val="5000"/>
+                  </a:schemeClr>
+                </a:solidFill>
+              </a:rPr>
               <a:t>Multithreaded </a:t>
             </a:r>
             <a:r>
-              <a:rPr lang="en-US" sz="1400" smtClean="0"/>
+              <a:rPr lang="en-US" sz="1400" smtClean="0">
+                <a:solidFill>
+                  <a:schemeClr val="tx1">
+                    <a:lumMod val="95000"/>
+                    <a:lumOff val="5000"/>
+                  </a:schemeClr>
+                </a:solidFill>
+              </a:rPr>
               <a:t>Portable Runtime</a:t>
             </a:r>
-            <a:endParaRPr lang="en-US" sz="1400" dirty="0"/>
+            <a:endParaRPr lang="en-US" sz="1400" dirty="0">
+              <a:solidFill>
+                <a:schemeClr val="tx1">
+                  <a:lumMod val="95000"/>
+                  <a:lumOff val="5000"/>
+                </a:schemeClr>
+              </a:solidFill>
+            </a:endParaRPr>
           </a:p>
         </p:txBody>
       </p:sp>
@@ -3286,12 +3273,18 @@
         </p:nvSpPr>
         <p:spPr>
           <a:xfrm>
-            <a:off x="2765475" y="4090557"/>
+            <a:off x="2819401" y="4013598"/>
             <a:ext cx="4269544" cy="380994"/>
           </a:xfrm>
           <a:prstGeom prst="rect">
             <a:avLst/>
           </a:prstGeom>
+          <a:solidFill>
+            <a:schemeClr val="accent5">
+              <a:lumMod val="40000"/>
+              <a:lumOff val="60000"/>
+            </a:schemeClr>
+          </a:solidFill>
           <a:ln>
             <a:headEnd type="none" w="med" len="med"/>
             <a:tailEnd type="none" w="med" len="med"/>
@@ -3317,10 +3310,24 @@
           <a:p>
             <a:pPr algn="ctr"/>
             <a:r>
-              <a:rPr lang="en-US" sz="1400" b="1" dirty="0" smtClean="0"/>
-              <a:t>Appweb HTTP Server Core</a:t>
-            </a:r>
-            <a:endParaRPr lang="en-US" sz="1400" b="1" dirty="0"/>
+              <a:rPr lang="en-US" sz="1400" dirty="0" smtClean="0">
+                <a:solidFill>
+                  <a:schemeClr val="tx1">
+                    <a:lumMod val="95000"/>
+                    <a:lumOff val="5000"/>
+                  </a:schemeClr>
+                </a:solidFill>
+              </a:rPr>
+              <a:t>Web Framework Pipeline</a:t>
+            </a:r>
+            <a:endParaRPr lang="en-US" sz="1400" dirty="0">
+              <a:solidFill>
+                <a:schemeClr val="tx1">
+                  <a:lumMod val="95000"/>
+                  <a:lumOff val="5000"/>
+                </a:schemeClr>
+              </a:solidFill>
+            </a:endParaRPr>
           </a:p>
         </p:txBody>
       </p:sp>
@@ -3332,12 +3339,17 @@
         </p:nvSpPr>
         <p:spPr>
           <a:xfrm>
-            <a:off x="2895600" y="2057230"/>
+            <a:off x="3377932" y="1885862"/>
             <a:ext cx="977113" cy="265109"/>
           </a:xfrm>
           <a:prstGeom prst="rect">
             <a:avLst/>
           </a:prstGeom>
+          <a:solidFill>
+            <a:schemeClr val="accent1">
+              <a:lumMod val="75000"/>
+            </a:schemeClr>
+          </a:solidFill>
           <a:ln>
             <a:solidFill>
               <a:schemeClr val="tx2">
@@ -3381,18 +3393,23 @@
       </p:sp>
       <p:sp>
         <p:nvSpPr>
-          <p:cNvPr id="55" name="Rectangle 54"/>
+          <p:cNvPr id="56" name="Rectangle 55"/>
           <p:cNvSpPr/>
           <p:nvPr/>
         </p:nvSpPr>
         <p:spPr>
           <a:xfrm>
-            <a:off x="2895600" y="2453504"/>
+            <a:off x="3377932" y="2273907"/>
             <a:ext cx="977113" cy="265109"/>
           </a:xfrm>
           <a:prstGeom prst="rect">
             <a:avLst/>
           </a:prstGeom>
+          <a:solidFill>
+            <a:schemeClr val="accent1">
+              <a:lumMod val="75000"/>
+            </a:schemeClr>
+          </a:solidFill>
           <a:ln>
             <a:solidFill>
               <a:schemeClr val="tx2">
@@ -3428,27 +3445,31 @@
           <a:p>
             <a:pPr algn="ctr"/>
             <a:r>
-              <a:rPr lang="en-US" sz="1400" b="1" dirty="0" err="1" smtClean="0"/>
-              <a:t>Ejscript</a:t>
-            </a:r>
-            <a:endParaRPr lang="en-US" sz="1400" b="1" dirty="0" smtClean="0"/>
-          </a:p>
-        </p:txBody>
-      </p:sp>
-      <p:sp>
-        <p:nvSpPr>
-          <p:cNvPr id="56" name="Rectangle 55"/>
+              <a:rPr lang="en-US" sz="1400" b="1" dirty="0" smtClean="0"/>
+              <a:t>PHP</a:t>
+            </a:r>
+          </a:p>
+        </p:txBody>
+      </p:sp>
+      <p:sp>
+        <p:nvSpPr>
+          <p:cNvPr id="57" name="Rectangle 56"/>
           <p:cNvSpPr/>
           <p:nvPr/>
         </p:nvSpPr>
         <p:spPr>
           <a:xfrm>
-            <a:off x="2895600" y="2849778"/>
+            <a:off x="3377932" y="2670181"/>
             <a:ext cx="977113" cy="265109"/>
           </a:xfrm>
           <a:prstGeom prst="rect">
             <a:avLst/>
           </a:prstGeom>
+          <a:solidFill>
+            <a:schemeClr val="accent1">
+              <a:lumMod val="75000"/>
+            </a:schemeClr>
+          </a:solidFill>
           <a:ln>
             <a:solidFill>
               <a:schemeClr val="tx2">
@@ -3485,25 +3506,30 @@
             <a:pPr algn="ctr"/>
             <a:r>
               <a:rPr lang="en-US" sz="1400" b="1" dirty="0" smtClean="0"/>
-              <a:t>PHP</a:t>
-            </a:r>
-          </a:p>
-        </p:txBody>
-      </p:sp>
-      <p:sp>
-        <p:nvSpPr>
-          <p:cNvPr id="57" name="Rectangle 56"/>
+              <a:t>CGI</a:t>
+            </a:r>
+          </a:p>
+        </p:txBody>
+      </p:sp>
+      <p:sp>
+        <p:nvSpPr>
+          <p:cNvPr id="58" name="Rectangle 57"/>
           <p:cNvSpPr/>
           <p:nvPr/>
         </p:nvSpPr>
         <p:spPr>
           <a:xfrm>
-            <a:off x="2895600" y="3246052"/>
+            <a:off x="5483026" y="1487382"/>
             <a:ext cx="977113" cy="265109"/>
           </a:xfrm>
           <a:prstGeom prst="rect">
             <a:avLst/>
           </a:prstGeom>
+          <a:solidFill>
+            <a:schemeClr val="accent1">
+              <a:lumMod val="75000"/>
+            </a:schemeClr>
+          </a:solidFill>
           <a:ln>
             <a:solidFill>
               <a:schemeClr val="tx2">
@@ -3540,25 +3566,30 @@
             <a:pPr algn="ctr"/>
             <a:r>
               <a:rPr lang="en-US" sz="1400" b="1" dirty="0" smtClean="0"/>
-              <a:t>CGI</a:t>
-            </a:r>
-          </a:p>
-        </p:txBody>
-      </p:sp>
-      <p:sp>
-        <p:nvSpPr>
-          <p:cNvPr id="58" name="Rectangle 57"/>
+              <a:t>Upload</a:t>
+            </a:r>
+          </a:p>
+        </p:txBody>
+      </p:sp>
+      <p:sp>
+        <p:nvSpPr>
+          <p:cNvPr id="59" name="Rectangle 58"/>
           <p:cNvSpPr/>
           <p:nvPr/>
         </p:nvSpPr>
         <p:spPr>
           <a:xfrm>
-            <a:off x="4143757" y="1660956"/>
+            <a:off x="3377932" y="3053777"/>
             <a:ext cx="977113" cy="265109"/>
           </a:xfrm>
           <a:prstGeom prst="rect">
             <a:avLst/>
           </a:prstGeom>
+          <a:solidFill>
+            <a:schemeClr val="accent1">
+              <a:lumMod val="75000"/>
+            </a:schemeClr>
+          </a:solidFill>
           <a:ln>
             <a:solidFill>
               <a:schemeClr val="tx2">
@@ -3594,26 +3625,32 @@
           <a:p>
             <a:pPr algn="ctr"/>
             <a:r>
-              <a:rPr lang="en-US" sz="1400" b="1" dirty="0" smtClean="0"/>
-              <a:t>Upload</a:t>
-            </a:r>
-          </a:p>
-        </p:txBody>
-      </p:sp>
-      <p:sp>
-        <p:nvSpPr>
-          <p:cNvPr id="59" name="Rectangle 58"/>
+              <a:rPr lang="en-US" sz="1400" b="1" dirty="0" err="1" smtClean="0"/>
+              <a:t>Dir</a:t>
+            </a:r>
+            <a:endParaRPr lang="en-US" sz="1400" b="1" dirty="0" smtClean="0"/>
+          </a:p>
+        </p:txBody>
+      </p:sp>
+      <p:sp>
+        <p:nvSpPr>
+          <p:cNvPr id="68" name="Rectangle 67"/>
           <p:cNvSpPr/>
           <p:nvPr/>
         </p:nvSpPr>
         <p:spPr>
           <a:xfrm>
-            <a:off x="2895600" y="3657600"/>
+            <a:off x="5486606" y="1883656"/>
             <a:ext cx="977113" cy="265109"/>
           </a:xfrm>
           <a:prstGeom prst="rect">
             <a:avLst/>
           </a:prstGeom>
+          <a:solidFill>
+            <a:schemeClr val="accent1">
+              <a:lumMod val="75000"/>
+            </a:schemeClr>
+          </a:solidFill>
           <a:ln>
             <a:solidFill>
               <a:schemeClr val="tx2">
@@ -3649,27 +3686,31 @@
           <a:p>
             <a:pPr algn="ctr"/>
             <a:r>
-              <a:rPr lang="en-US" sz="1400" b="1" dirty="0" err="1" smtClean="0"/>
-              <a:t>Dir</a:t>
-            </a:r>
-            <a:endParaRPr lang="en-US" sz="1400" b="1" dirty="0" smtClean="0"/>
-          </a:p>
-        </p:txBody>
-      </p:sp>
-      <p:sp>
-        <p:nvSpPr>
-          <p:cNvPr id="68" name="Rectangle 67"/>
+              <a:rPr lang="en-US" sz="1400" b="1" dirty="0" smtClean="0"/>
+              <a:t>Chunk</a:t>
+            </a:r>
+          </a:p>
+        </p:txBody>
+      </p:sp>
+      <p:sp>
+        <p:nvSpPr>
+          <p:cNvPr id="69" name="Rectangle 68"/>
           <p:cNvSpPr/>
           <p:nvPr/>
         </p:nvSpPr>
         <p:spPr>
           <a:xfrm>
-            <a:off x="4147337" y="2057230"/>
+            <a:off x="5486606" y="2279930"/>
             <a:ext cx="977113" cy="265109"/>
           </a:xfrm>
           <a:prstGeom prst="rect">
             <a:avLst/>
           </a:prstGeom>
+          <a:solidFill>
+            <a:schemeClr val="accent1">
+              <a:lumMod val="75000"/>
+            </a:schemeClr>
+          </a:solidFill>
           <a:ln>
             <a:solidFill>
               <a:schemeClr val="tx2">
@@ -3706,172 +3747,7 @@
             <a:pPr algn="ctr"/>
             <a:r>
               <a:rPr lang="en-US" sz="1400" b="1" dirty="0" smtClean="0"/>
-              <a:t>Chunk</a:t>
-            </a:r>
-          </a:p>
-        </p:txBody>
-      </p:sp>
-      <p:sp>
-        <p:nvSpPr>
-          <p:cNvPr id="69" name="Rectangle 68"/>
-          <p:cNvSpPr/>
-          <p:nvPr/>
-        </p:nvSpPr>
-        <p:spPr>
-          <a:xfrm>
-            <a:off x="4147337" y="2453504"/>
-            <a:ext cx="977113" cy="265109"/>
-          </a:xfrm>
-          <a:prstGeom prst="rect">
-            <a:avLst/>
-          </a:prstGeom>
-          <a:ln>
-            <a:solidFill>
-              <a:schemeClr val="tx2">
-                <a:lumMod val="75000"/>
-              </a:schemeClr>
-            </a:solidFill>
-          </a:ln>
-          <a:effectLst>
-            <a:outerShdw blurRad="40000" dist="23000" dir="5400000" rotWithShape="0">
-              <a:srgbClr val="000000">
-                <a:alpha val="35000"/>
-              </a:srgbClr>
-            </a:outerShdw>
-          </a:effectLst>
-        </p:spPr>
-        <p:style>
-          <a:lnRef idx="1">
-            <a:schemeClr val="accent4"/>
-          </a:lnRef>
-          <a:fillRef idx="3">
-            <a:schemeClr val="accent4"/>
-          </a:fillRef>
-          <a:effectRef idx="2">
-            <a:schemeClr val="accent4"/>
-          </a:effectRef>
-          <a:fontRef idx="minor">
-            <a:schemeClr val="lt1"/>
-          </a:fontRef>
-        </p:style>
-        <p:txBody>
-          <a:bodyPr rtlCol="0" anchor="ctr"/>
-          <a:lstStyle/>
-          <a:p>
-            <a:pPr algn="ctr"/>
-            <a:r>
-              <a:rPr lang="en-US" sz="1400" b="1" dirty="0" smtClean="0"/>
               <a:t>Range</a:t>
-            </a:r>
-          </a:p>
-        </p:txBody>
-      </p:sp>
-      <p:sp>
-        <p:nvSpPr>
-          <p:cNvPr id="70" name="Rectangle 69"/>
-          <p:cNvSpPr/>
-          <p:nvPr/>
-        </p:nvSpPr>
-        <p:spPr>
-          <a:xfrm>
-            <a:off x="5476505" y="1660956"/>
-            <a:ext cx="977113" cy="265109"/>
-          </a:xfrm>
-          <a:prstGeom prst="rect">
-            <a:avLst/>
-          </a:prstGeom>
-          <a:ln>
-            <a:solidFill>
-              <a:schemeClr val="tx2">
-                <a:lumMod val="75000"/>
-              </a:schemeClr>
-            </a:solidFill>
-          </a:ln>
-          <a:effectLst>
-            <a:outerShdw blurRad="40000" dist="23000" dir="5400000" rotWithShape="0">
-              <a:srgbClr val="000000">
-                <a:alpha val="35000"/>
-              </a:srgbClr>
-            </a:outerShdw>
-          </a:effectLst>
-        </p:spPr>
-        <p:style>
-          <a:lnRef idx="1">
-            <a:schemeClr val="accent4"/>
-          </a:lnRef>
-          <a:fillRef idx="3">
-            <a:schemeClr val="accent4"/>
-          </a:fillRef>
-          <a:effectRef idx="2">
-            <a:schemeClr val="accent4"/>
-          </a:effectRef>
-          <a:fontRef idx="minor">
-            <a:schemeClr val="lt1"/>
-          </a:fontRef>
-        </p:style>
-        <p:txBody>
-          <a:bodyPr rtlCol="0" anchor="ctr"/>
-          <a:lstStyle/>
-          <a:p>
-            <a:pPr algn="ctr"/>
-            <a:r>
-              <a:rPr lang="en-US" sz="1400" b="1" dirty="0" smtClean="0"/>
-              <a:t>Net</a:t>
-            </a:r>
-          </a:p>
-        </p:txBody>
-      </p:sp>
-      <p:sp>
-        <p:nvSpPr>
-          <p:cNvPr id="71" name="Rectangle 70"/>
-          <p:cNvSpPr/>
-          <p:nvPr/>
-        </p:nvSpPr>
-        <p:spPr>
-          <a:xfrm>
-            <a:off x="5476505" y="2057230"/>
-            <a:ext cx="977113" cy="265109"/>
-          </a:xfrm>
-          <a:prstGeom prst="rect">
-            <a:avLst/>
-          </a:prstGeom>
-          <a:ln>
-            <a:solidFill>
-              <a:schemeClr val="tx2">
-                <a:lumMod val="75000"/>
-              </a:schemeClr>
-            </a:solidFill>
-          </a:ln>
-          <a:effectLst>
-            <a:outerShdw blurRad="40000" dist="23000" dir="5400000" rotWithShape="0">
-              <a:srgbClr val="000000">
-                <a:alpha val="35000"/>
-              </a:srgbClr>
-            </a:outerShdw>
-          </a:effectLst>
-        </p:spPr>
-        <p:style>
-          <a:lnRef idx="1">
-            <a:schemeClr val="accent4"/>
-          </a:lnRef>
-          <a:fillRef idx="3">
-            <a:schemeClr val="accent4"/>
-          </a:fillRef>
-          <a:effectRef idx="2">
-            <a:schemeClr val="accent4"/>
-          </a:effectRef>
-          <a:fontRef idx="minor">
-            <a:schemeClr val="lt1"/>
-          </a:fontRef>
-        </p:style>
-        <p:txBody>
-          <a:bodyPr rtlCol="0" anchor="ctr"/>
-          <a:lstStyle/>
-          <a:p>
-            <a:pPr algn="ctr"/>
-            <a:r>
-              <a:rPr lang="en-US" sz="1400" b="1" dirty="0" smtClean="0"/>
-              <a:t>Send</a:t>
             </a:r>
           </a:p>
         </p:txBody>
@@ -3884,7 +3760,7 @@
         </p:nvSpPr>
         <p:spPr>
           <a:xfrm>
-            <a:off x="2895600" y="759023"/>
+            <a:off x="3377932" y="1029689"/>
             <a:ext cx="851515" cy="307777"/>
           </a:xfrm>
           <a:prstGeom prst="rect">
@@ -3899,10 +3775,10 @@
           <a:lstStyle/>
           <a:p>
             <a:r>
-              <a:rPr lang="en-US" sz="1400" b="1" dirty="0" smtClean="0"/>
+              <a:rPr lang="en-US" sz="1400" dirty="0" smtClean="0"/>
               <a:t>Handlers</a:t>
             </a:r>
-            <a:endParaRPr lang="en-US" sz="1400" b="1" dirty="0"/>
+            <a:endParaRPr lang="en-US" sz="1400" dirty="0"/>
           </a:p>
         </p:txBody>
       </p:sp>
@@ -3914,7 +3790,7 @@
         </p:nvSpPr>
         <p:spPr>
           <a:xfrm>
-            <a:off x="4343400" y="1094200"/>
+            <a:off x="5648416" y="1048440"/>
             <a:ext cx="646331" cy="307777"/>
           </a:xfrm>
           <a:prstGeom prst="rect">
@@ -3929,92 +3805,10 @@
           <a:lstStyle/>
           <a:p>
             <a:r>
-              <a:rPr lang="en-US" sz="1400" b="1" dirty="0" smtClean="0"/>
+              <a:rPr lang="en-US" sz="1400" dirty="0" smtClean="0"/>
               <a:t>Filters</a:t>
             </a:r>
-            <a:endParaRPr lang="en-US" sz="1400" b="1" dirty="0"/>
-          </a:p>
-        </p:txBody>
-      </p:sp>
-      <p:sp>
-        <p:nvSpPr>
-          <p:cNvPr id="75" name="TextBox 74"/>
-          <p:cNvSpPr txBox="1"/>
-          <p:nvPr/>
-        </p:nvSpPr>
-        <p:spPr>
-          <a:xfrm>
-            <a:off x="5236622" y="793360"/>
-            <a:ext cx="1031051" cy="307777"/>
-          </a:xfrm>
-          <a:prstGeom prst="rect">
-            <a:avLst/>
-          </a:prstGeom>
-          <a:noFill/>
-        </p:spPr>
-        <p:txBody>
-          <a:bodyPr wrap="none" rtlCol="0">
-            <a:spAutoFit/>
-          </a:bodyPr>
-          <a:lstStyle/>
-          <a:p>
-            <a:r>
-              <a:rPr lang="en-US" sz="1400" b="1" dirty="0" smtClean="0"/>
-              <a:t>Connectors</a:t>
-            </a:r>
-            <a:endParaRPr lang="en-US" sz="1400" b="1" dirty="0"/>
-          </a:p>
-        </p:txBody>
-      </p:sp>
-      <p:sp>
-        <p:nvSpPr>
-          <p:cNvPr id="78" name="Rectangle 77"/>
-          <p:cNvSpPr/>
-          <p:nvPr/>
-        </p:nvSpPr>
-        <p:spPr>
-          <a:xfrm>
-            <a:off x="4109890" y="2954468"/>
-            <a:ext cx="2443310" cy="968241"/>
-          </a:xfrm>
-          <a:prstGeom prst="rect">
-            <a:avLst/>
-          </a:prstGeom>
-          <a:ln>
-            <a:headEnd type="none" w="med" len="med"/>
-            <a:tailEnd type="none" w="med" len="med"/>
-          </a:ln>
-        </p:spPr>
-        <p:style>
-          <a:lnRef idx="1">
-            <a:schemeClr val="accent1"/>
-          </a:lnRef>
-          <a:fillRef idx="3">
-            <a:schemeClr val="accent1"/>
-          </a:fillRef>
-          <a:effectRef idx="2">
-            <a:schemeClr val="accent1"/>
-          </a:effectRef>
-          <a:fontRef idx="minor">
-            <a:schemeClr val="lt1"/>
-          </a:fontRef>
-        </p:style>
-        <p:txBody>
-          <a:bodyPr rtlCol="0" anchor="ctr"/>
-          <a:lstStyle/>
-          <a:p>
-            <a:pPr algn="ctr"/>
-            <a:r>
-              <a:rPr lang="en-US" sz="1400" b="1" dirty="0" smtClean="0"/>
-              <a:t>Routing</a:t>
-            </a:r>
-            <a:br>
-              <a:rPr lang="en-US" sz="1400" b="1" dirty="0" smtClean="0"/>
-            </a:br>
-            <a:r>
-              <a:rPr lang="en-US" sz="1400" b="1" dirty="0" smtClean="0"/>
-              <a:t>Engine</a:t>
-            </a:r>
+            <a:endParaRPr lang="en-US" sz="1400" dirty="0"/>
           </a:p>
         </p:txBody>
       </p:sp>
@@ -4083,7 +3877,7 @@
         <p:spPr>
           <a:xfrm>
             <a:off x="1905001" y="2895600"/>
-            <a:ext cx="533399" cy="1588"/>
+            <a:ext cx="533399" cy="457200"/>
           </a:xfrm>
           <a:prstGeom prst="bentConnector3">
             <a:avLst>
@@ -4123,8 +3917,8 @@
         </p:nvSpPr>
         <p:spPr>
           <a:xfrm>
-            <a:off x="2765474" y="1523194"/>
-            <a:ext cx="1196925" cy="2499743"/>
+            <a:off x="3247806" y="1368156"/>
+            <a:ext cx="1196925" cy="2110015"/>
           </a:xfrm>
           <a:prstGeom prst="rect">
             <a:avLst/>
@@ -4174,7 +3968,7 @@
         </p:nvSpPr>
         <p:spPr>
           <a:xfrm>
-            <a:off x="4039697" y="1523195"/>
+            <a:off x="5377556" y="1368156"/>
             <a:ext cx="1196925" cy="1326582"/>
           </a:xfrm>
           <a:prstGeom prst="rect">
@@ -4219,41 +4013,38 @@
       </p:sp>
       <p:sp>
         <p:nvSpPr>
-          <p:cNvPr id="93" name="Rectangle 92"/>
+          <p:cNvPr id="28" name="Rectangle 27"/>
           <p:cNvSpPr/>
           <p:nvPr/>
         </p:nvSpPr>
         <p:spPr>
           <a:xfrm>
-            <a:off x="5389820" y="1523194"/>
-            <a:ext cx="1196925" cy="930309"/>
+            <a:off x="2819400" y="4504229"/>
+            <a:ext cx="1210406" cy="380994"/>
           </a:xfrm>
           <a:prstGeom prst="rect">
             <a:avLst/>
           </a:prstGeom>
-          <a:noFill/>
-          <a:ln w="12700" cap="flat" cmpd="sng" algn="ctr">
-            <a:solidFill>
-              <a:schemeClr val="tx2">
-                <a:lumMod val="60000"/>
-                <a:lumOff val="40000"/>
-              </a:schemeClr>
-            </a:solidFill>
-            <a:prstDash val="solid"/>
-            <a:round/>
+          <a:solidFill>
+            <a:schemeClr val="accent5">
+              <a:lumMod val="40000"/>
+              <a:lumOff val="60000"/>
+            </a:schemeClr>
+          </a:solidFill>
+          <a:ln>
             <a:headEnd type="none" w="med" len="med"/>
             <a:tailEnd type="none" w="med" len="med"/>
           </a:ln>
         </p:spPr>
         <p:style>
           <a:lnRef idx="1">
-            <a:schemeClr val="accent1"/>
+            <a:schemeClr val="accent2"/>
           </a:lnRef>
           <a:fillRef idx="3">
-            <a:schemeClr val="accent1"/>
+            <a:schemeClr val="accent2"/>
           </a:fillRef>
           <a:effectRef idx="2">
-            <a:schemeClr val="accent1"/>
+            <a:schemeClr val="accent2"/>
           </a:effectRef>
           <a:fontRef idx="minor">
             <a:schemeClr val="lt1"/>
@@ -4264,7 +4055,319 @@
           <a:lstStyle/>
           <a:p>
             <a:pPr algn="ctr"/>
-            <a:endParaRPr lang="en-US"/>
+            <a:r>
+              <a:rPr lang="en-US" sz="1400" dirty="0" smtClean="0">
+                <a:solidFill>
+                  <a:schemeClr val="tx1">
+                    <a:lumMod val="95000"/>
+                    <a:lumOff val="5000"/>
+                  </a:schemeClr>
+                </a:solidFill>
+              </a:rPr>
+              <a:t>HTTP/1</a:t>
+            </a:r>
+            <a:endParaRPr lang="en-US" sz="1400" dirty="0">
+              <a:solidFill>
+                <a:schemeClr val="tx1">
+                  <a:lumMod val="95000"/>
+                  <a:lumOff val="5000"/>
+                </a:schemeClr>
+              </a:solidFill>
+            </a:endParaRPr>
+          </a:p>
+        </p:txBody>
+      </p:sp>
+      <p:sp>
+        <p:nvSpPr>
+          <p:cNvPr id="30" name="Rectangle 29"/>
+          <p:cNvSpPr/>
+          <p:nvPr/>
+        </p:nvSpPr>
+        <p:spPr>
+          <a:xfrm>
+            <a:off x="2819400" y="4978277"/>
+            <a:ext cx="4269544" cy="380994"/>
+          </a:xfrm>
+          <a:prstGeom prst="rect">
+            <a:avLst/>
+          </a:prstGeom>
+          <a:solidFill>
+            <a:schemeClr val="accent5">
+              <a:lumMod val="40000"/>
+              <a:lumOff val="60000"/>
+            </a:schemeClr>
+          </a:solidFill>
+          <a:ln>
+            <a:headEnd type="none" w="med" len="med"/>
+            <a:tailEnd type="none" w="med" len="med"/>
+          </a:ln>
+        </p:spPr>
+        <p:style>
+          <a:lnRef idx="1">
+            <a:schemeClr val="accent2"/>
+          </a:lnRef>
+          <a:fillRef idx="3">
+            <a:schemeClr val="accent2"/>
+          </a:fillRef>
+          <a:effectRef idx="2">
+            <a:schemeClr val="accent2"/>
+          </a:effectRef>
+          <a:fontRef idx="minor">
+            <a:schemeClr val="lt1"/>
+          </a:fontRef>
+        </p:style>
+        <p:txBody>
+          <a:bodyPr rtlCol="0" anchor="ctr"/>
+          <a:lstStyle/>
+          <a:p>
+            <a:pPr algn="ctr"/>
+            <a:r>
+              <a:rPr lang="en-US" sz="1400" dirty="0" smtClean="0">
+                <a:solidFill>
+                  <a:schemeClr val="tx1">
+                    <a:lumMod val="95000"/>
+                    <a:lumOff val="5000"/>
+                  </a:schemeClr>
+                </a:solidFill>
+              </a:rPr>
+              <a:t>Secure Sockets (SSL)</a:t>
+            </a:r>
+            <a:endParaRPr lang="en-US" sz="1400" dirty="0">
+              <a:solidFill>
+                <a:schemeClr val="tx1">
+                  <a:lumMod val="95000"/>
+                  <a:lumOff val="5000"/>
+                </a:schemeClr>
+              </a:solidFill>
+            </a:endParaRPr>
+          </a:p>
+        </p:txBody>
+      </p:sp>
+      <p:sp>
+        <p:nvSpPr>
+          <p:cNvPr id="31" name="Rectangle 30"/>
+          <p:cNvSpPr/>
+          <p:nvPr/>
+        </p:nvSpPr>
+        <p:spPr>
+          <a:xfrm>
+            <a:off x="4348969" y="4500580"/>
+            <a:ext cx="1210406" cy="380994"/>
+          </a:xfrm>
+          <a:prstGeom prst="rect">
+            <a:avLst/>
+          </a:prstGeom>
+          <a:solidFill>
+            <a:schemeClr val="accent5">
+              <a:lumMod val="40000"/>
+              <a:lumOff val="60000"/>
+            </a:schemeClr>
+          </a:solidFill>
+          <a:ln>
+            <a:headEnd type="none" w="med" len="med"/>
+            <a:tailEnd type="none" w="med" len="med"/>
+          </a:ln>
+        </p:spPr>
+        <p:style>
+          <a:lnRef idx="1">
+            <a:schemeClr val="accent2"/>
+          </a:lnRef>
+          <a:fillRef idx="3">
+            <a:schemeClr val="accent2"/>
+          </a:fillRef>
+          <a:effectRef idx="2">
+            <a:schemeClr val="accent2"/>
+          </a:effectRef>
+          <a:fontRef idx="minor">
+            <a:schemeClr val="lt1"/>
+          </a:fontRef>
+        </p:style>
+        <p:txBody>
+          <a:bodyPr rtlCol="0" anchor="ctr"/>
+          <a:lstStyle/>
+          <a:p>
+            <a:pPr algn="ctr"/>
+            <a:r>
+              <a:rPr lang="en-US" sz="1400" dirty="0" smtClean="0">
+                <a:solidFill>
+                  <a:schemeClr val="tx1">
+                    <a:lumMod val="95000"/>
+                    <a:lumOff val="5000"/>
+                  </a:schemeClr>
+                </a:solidFill>
+              </a:rPr>
+              <a:t>HTTP/2</a:t>
+            </a:r>
+            <a:endParaRPr lang="en-US" sz="1400" dirty="0">
+              <a:solidFill>
+                <a:schemeClr val="tx1">
+                  <a:lumMod val="95000"/>
+                  <a:lumOff val="5000"/>
+                </a:schemeClr>
+              </a:solidFill>
+            </a:endParaRPr>
+          </a:p>
+        </p:txBody>
+      </p:sp>
+      <p:sp>
+        <p:nvSpPr>
+          <p:cNvPr id="32" name="Rectangle 31"/>
+          <p:cNvSpPr/>
+          <p:nvPr/>
+        </p:nvSpPr>
+        <p:spPr>
+          <a:xfrm>
+            <a:off x="5878538" y="4497901"/>
+            <a:ext cx="1210406" cy="380994"/>
+          </a:xfrm>
+          <a:prstGeom prst="rect">
+            <a:avLst/>
+          </a:prstGeom>
+          <a:solidFill>
+            <a:schemeClr val="accent5">
+              <a:lumMod val="40000"/>
+              <a:lumOff val="60000"/>
+            </a:schemeClr>
+          </a:solidFill>
+          <a:ln>
+            <a:headEnd type="none" w="med" len="med"/>
+            <a:tailEnd type="none" w="med" len="med"/>
+          </a:ln>
+        </p:spPr>
+        <p:style>
+          <a:lnRef idx="1">
+            <a:schemeClr val="accent2"/>
+          </a:lnRef>
+          <a:fillRef idx="3">
+            <a:schemeClr val="accent2"/>
+          </a:fillRef>
+          <a:effectRef idx="2">
+            <a:schemeClr val="accent2"/>
+          </a:effectRef>
+          <a:fontRef idx="minor">
+            <a:schemeClr val="lt1"/>
+          </a:fontRef>
+        </p:style>
+        <p:txBody>
+          <a:bodyPr rtlCol="0" anchor="ctr"/>
+          <a:lstStyle/>
+          <a:p>
+            <a:pPr algn="ctr"/>
+            <a:r>
+              <a:rPr lang="en-US" sz="1400" dirty="0" err="1" smtClean="0">
+                <a:solidFill>
+                  <a:schemeClr val="tx1">
+                    <a:lumMod val="95000"/>
+                    <a:lumOff val="5000"/>
+                  </a:schemeClr>
+                </a:solidFill>
+              </a:rPr>
+              <a:t>WebSockets</a:t>
+            </a:r>
+            <a:endParaRPr lang="en-US" sz="1400" dirty="0">
+              <a:solidFill>
+                <a:schemeClr val="tx1">
+                  <a:lumMod val="95000"/>
+                  <a:lumOff val="5000"/>
+                </a:schemeClr>
+              </a:solidFill>
+            </a:endParaRPr>
+          </a:p>
+        </p:txBody>
+      </p:sp>
+      <p:sp>
+        <p:nvSpPr>
+          <p:cNvPr id="33" name="TextBox 32"/>
+          <p:cNvSpPr txBox="1"/>
+          <p:nvPr/>
+        </p:nvSpPr>
+        <p:spPr>
+          <a:xfrm>
+            <a:off x="4035454" y="671440"/>
+            <a:ext cx="1686039" cy="338554"/>
+          </a:xfrm>
+          <a:prstGeom prst="rect">
+            <a:avLst/>
+          </a:prstGeom>
+          <a:noFill/>
+        </p:spPr>
+        <p:txBody>
+          <a:bodyPr wrap="none" rtlCol="0">
+            <a:spAutoFit/>
+          </a:bodyPr>
+          <a:lstStyle/>
+          <a:p>
+            <a:r>
+              <a:rPr lang="en-US" sz="1600" b="1" smtClean="0"/>
+              <a:t>Appweb Modules</a:t>
+            </a:r>
+            <a:endParaRPr lang="en-US" sz="1600" b="1" dirty="0"/>
+          </a:p>
+        </p:txBody>
+      </p:sp>
+      <p:sp>
+        <p:nvSpPr>
+          <p:cNvPr id="34" name="Rectangle 33"/>
+          <p:cNvSpPr/>
+          <p:nvPr/>
+        </p:nvSpPr>
+        <p:spPr>
+          <a:xfrm>
+            <a:off x="2819400" y="3539550"/>
+            <a:ext cx="4269544" cy="380994"/>
+          </a:xfrm>
+          <a:prstGeom prst="rect">
+            <a:avLst/>
+          </a:prstGeom>
+          <a:solidFill>
+            <a:schemeClr val="accent5">
+              <a:lumMod val="40000"/>
+              <a:lumOff val="60000"/>
+            </a:schemeClr>
+          </a:solidFill>
+          <a:ln>
+            <a:headEnd type="none" w="med" len="med"/>
+            <a:tailEnd type="none" w="med" len="med"/>
+          </a:ln>
+        </p:spPr>
+        <p:style>
+          <a:lnRef idx="1">
+            <a:schemeClr val="accent2"/>
+          </a:lnRef>
+          <a:fillRef idx="3">
+            <a:schemeClr val="accent2"/>
+          </a:fillRef>
+          <a:effectRef idx="2">
+            <a:schemeClr val="accent2"/>
+          </a:effectRef>
+          <a:fontRef idx="minor">
+            <a:schemeClr val="lt1"/>
+          </a:fontRef>
+        </p:style>
+        <p:txBody>
+          <a:bodyPr rtlCol="0" anchor="ctr"/>
+          <a:lstStyle/>
+          <a:p>
+            <a:pPr algn="ctr"/>
+            <a:r>
+              <a:rPr lang="en-US" sz="1400" dirty="0" smtClean="0">
+                <a:solidFill>
+                  <a:schemeClr val="tx1">
+                    <a:lumMod val="95000"/>
+                    <a:lumOff val="5000"/>
+                  </a:schemeClr>
+                </a:solidFill>
+              </a:rPr>
+              <a:t>Request Routing</a:t>
+            </a:r>
+            <a:endParaRPr lang="en-US" sz="1400" dirty="0">
+              <a:solidFill>
+                <a:schemeClr val="tx1">
+                  <a:lumMod val="95000"/>
+                  <a:lumOff val="5000"/>
+                </a:schemeClr>
+              </a:solidFill>
+            </a:endParaRPr>
           </a:p>
         </p:txBody>
       </p:sp>

</xml_diff>